<commit_message>
Added notebook with answers for queries in Session 3
</commit_message>
<xml_diff>
--- a/session3/B3-SQL_Filtering.pptx
+++ b/session3/B3-SQL_Filtering.pptx
@@ -5,10 +5,10 @@
     <p:sldMasterId id="2147483660" r:id="rId1"/>
   </p:sldMasterIdLst>
   <p:notesMasterIdLst>
-    <p:notesMasterId r:id="rId23"/>
+    <p:notesMasterId r:id="rId20"/>
   </p:notesMasterIdLst>
   <p:handoutMasterIdLst>
-    <p:handoutMasterId r:id="rId24"/>
+    <p:handoutMasterId r:id="rId21"/>
   </p:handoutMasterIdLst>
   <p:sldIdLst>
     <p:sldId id="256" r:id="rId2"/>
@@ -27,11 +27,8 @@
     <p:sldId id="303" r:id="rId15"/>
     <p:sldId id="335" r:id="rId16"/>
     <p:sldId id="366" r:id="rId17"/>
-    <p:sldId id="363" r:id="rId18"/>
-    <p:sldId id="261" r:id="rId19"/>
-    <p:sldId id="288" r:id="rId20"/>
-    <p:sldId id="368" r:id="rId21"/>
-    <p:sldId id="369" r:id="rId22"/>
+    <p:sldId id="288" r:id="rId18"/>
+    <p:sldId id="369" r:id="rId19"/>
   </p:sldIdLst>
   <p:sldSz cx="9144000" cy="6858000" type="screen4x3"/>
   <p:notesSz cx="7315200" cy="9601200"/>
@@ -324,7 +321,7 @@
             <a:fld id="{0F6AC800-BF99-41BB-8DE5-8FC7E09D6C23}" type="datetimeFigureOut">
               <a:rPr lang="en-US" smtClean="0"/>
               <a:pPr/>
-              <a:t>2/21/2020</a:t>
+              <a:t>3/29/2020</a:t>
             </a:fld>
             <a:endParaRPr lang="en-US" dirty="0"/>
           </a:p>
@@ -728,7 +725,7 @@
           <a:p>
             <a:fld id="{5F4C8C79-FAFE-4D56-A4D5-361B65C3B3FA}" type="datetimeFigureOut">
               <a:rPr lang="en-US" smtClean="0"/>
-              <a:t>2/21/2020</a:t>
+              <a:t>3/29/2020</a:t>
             </a:fld>
             <a:endParaRPr lang="en-US"/>
           </a:p>
@@ -898,7 +895,7 @@
           <a:p>
             <a:fld id="{5F4C8C79-FAFE-4D56-A4D5-361B65C3B3FA}" type="datetimeFigureOut">
               <a:rPr lang="en-US" smtClean="0"/>
-              <a:t>2/21/2020</a:t>
+              <a:t>3/29/2020</a:t>
             </a:fld>
             <a:endParaRPr lang="en-US"/>
           </a:p>
@@ -1078,7 +1075,7 @@
           <a:p>
             <a:fld id="{5F4C8C79-FAFE-4D56-A4D5-361B65C3B3FA}" type="datetimeFigureOut">
               <a:rPr lang="en-US" smtClean="0"/>
-              <a:t>2/21/2020</a:t>
+              <a:t>3/29/2020</a:t>
             </a:fld>
             <a:endParaRPr lang="en-US"/>
           </a:p>
@@ -1279,7 +1276,7 @@
           <a:p>
             <a:fld id="{5F4C8C79-FAFE-4D56-A4D5-361B65C3B3FA}" type="datetimeFigureOut">
               <a:rPr lang="en-US" smtClean="0"/>
-              <a:t>2/21/2020</a:t>
+              <a:t>3/29/2020</a:t>
             </a:fld>
             <a:endParaRPr lang="en-US"/>
           </a:p>
@@ -1523,7 +1520,7 @@
           <a:p>
             <a:fld id="{5F4C8C79-FAFE-4D56-A4D5-361B65C3B3FA}" type="datetimeFigureOut">
               <a:rPr lang="en-US" smtClean="0"/>
-              <a:t>2/21/2020</a:t>
+              <a:t>3/29/2020</a:t>
             </a:fld>
             <a:endParaRPr lang="en-US"/>
           </a:p>
@@ -1755,7 +1752,7 @@
           <a:p>
             <a:fld id="{5F4C8C79-FAFE-4D56-A4D5-361B65C3B3FA}" type="datetimeFigureOut">
               <a:rPr lang="en-US" smtClean="0"/>
-              <a:t>2/21/2020</a:t>
+              <a:t>3/29/2020</a:t>
             </a:fld>
             <a:endParaRPr lang="en-US"/>
           </a:p>
@@ -2122,7 +2119,7 @@
           <a:p>
             <a:fld id="{5F4C8C79-FAFE-4D56-A4D5-361B65C3B3FA}" type="datetimeFigureOut">
               <a:rPr lang="en-US" smtClean="0"/>
-              <a:t>2/21/2020</a:t>
+              <a:t>3/29/2020</a:t>
             </a:fld>
             <a:endParaRPr lang="en-US"/>
           </a:p>
@@ -2240,7 +2237,7 @@
           <a:p>
             <a:fld id="{5F4C8C79-FAFE-4D56-A4D5-361B65C3B3FA}" type="datetimeFigureOut">
               <a:rPr lang="en-US" smtClean="0"/>
-              <a:t>2/21/2020</a:t>
+              <a:t>3/29/2020</a:t>
             </a:fld>
             <a:endParaRPr lang="en-US"/>
           </a:p>
@@ -2335,7 +2332,7 @@
           <a:p>
             <a:fld id="{5F4C8C79-FAFE-4D56-A4D5-361B65C3B3FA}" type="datetimeFigureOut">
               <a:rPr lang="en-US" smtClean="0"/>
-              <a:t>2/21/2020</a:t>
+              <a:t>3/29/2020</a:t>
             </a:fld>
             <a:endParaRPr lang="en-US"/>
           </a:p>
@@ -2612,7 +2609,7 @@
           <a:p>
             <a:fld id="{5F4C8C79-FAFE-4D56-A4D5-361B65C3B3FA}" type="datetimeFigureOut">
               <a:rPr lang="en-US" smtClean="0"/>
-              <a:t>2/21/2020</a:t>
+              <a:t>3/29/2020</a:t>
             </a:fld>
             <a:endParaRPr lang="en-US"/>
           </a:p>
@@ -2869,7 +2866,7 @@
           <a:p>
             <a:fld id="{5F4C8C79-FAFE-4D56-A4D5-361B65C3B3FA}" type="datetimeFigureOut">
               <a:rPr lang="en-US" smtClean="0"/>
-              <a:t>2/21/2020</a:t>
+              <a:t>3/29/2020</a:t>
             </a:fld>
             <a:endParaRPr lang="en-US"/>
           </a:p>
@@ -3082,7 +3079,7 @@
             <a:fld id="{5F4C8C79-FAFE-4D56-A4D5-361B65C3B3FA}" type="datetimeFigureOut">
               <a:rPr lang="en-US" smtClean="0"/>
               <a:pPr/>
-              <a:t>2/21/2020</a:t>
+              <a:t>3/29/2020</a:t>
             </a:fld>
             <a:endParaRPr lang="en-US" dirty="0"/>
           </a:p>
@@ -3569,7 +3566,7 @@
           </a:ln>
           <a:extLst>
             <a:ext uri="{C572A759-6A51-4108-AA02-DFA0A04FC94B}">
-              <ma14:wrappingTextBoxFlag xmlns="" xmlns:ma14="http://schemas.microsoft.com/office/mac/drawingml/2011/main" val="1"/>
+              <ma14:wrappingTextBoxFlag xmlns:ma14="http://schemas.microsoft.com/office/mac/drawingml/2011/main" xmlns="" val="1"/>
             </a:ext>
           </a:extLst>
         </p:spPr>
@@ -3671,7 +3668,7 @@
           </a:ln>
           <a:extLst>
             <a:ext uri="{C572A759-6A51-4108-AA02-DFA0A04FC94B}">
-              <ma14:wrappingTextBoxFlag xmlns="" xmlns:ma14="http://schemas.microsoft.com/office/mac/drawingml/2011/main" val="1"/>
+              <ma14:wrappingTextBoxFlag xmlns:ma14="http://schemas.microsoft.com/office/mac/drawingml/2011/main" xmlns="" val="1"/>
             </a:ext>
           </a:extLst>
         </p:spPr>
@@ -4609,7 +4606,7 @@
           </a:ln>
           <a:extLst>
             <a:ext uri="{C572A759-6A51-4108-AA02-DFA0A04FC94B}">
-              <ma14:wrappingTextBoxFlag xmlns="" xmlns:ma14="http://schemas.microsoft.com/office/mac/drawingml/2011/main" val="1"/>
+              <ma14:wrappingTextBoxFlag xmlns:ma14="http://schemas.microsoft.com/office/mac/drawingml/2011/main" xmlns="" val="1"/>
             </a:ext>
           </a:extLst>
         </p:spPr>
@@ -4681,7 +4678,7 @@
           </a:ln>
           <a:extLst>
             <a:ext uri="{C572A759-6A51-4108-AA02-DFA0A04FC94B}">
-              <ma14:wrappingTextBoxFlag xmlns="" xmlns:ma14="http://schemas.microsoft.com/office/mac/drawingml/2011/main" val="1"/>
+              <ma14:wrappingTextBoxFlag xmlns:ma14="http://schemas.microsoft.com/office/mac/drawingml/2011/main" xmlns="" val="1"/>
             </a:ext>
           </a:extLst>
         </p:spPr>
@@ -5009,7 +5006,7 @@
           </a:ln>
           <a:extLst>
             <a:ext uri="{C572A759-6A51-4108-AA02-DFA0A04FC94B}">
-              <ma14:wrappingTextBoxFlag xmlns="" xmlns:ma14="http://schemas.microsoft.com/office/mac/drawingml/2011/main" val="1"/>
+              <ma14:wrappingTextBoxFlag xmlns:ma14="http://schemas.microsoft.com/office/mac/drawingml/2011/main" xmlns="" val="1"/>
             </a:ext>
           </a:extLst>
         </p:spPr>
@@ -5078,7 +5075,7 @@
           </a:ln>
           <a:extLst>
             <a:ext uri="{C572A759-6A51-4108-AA02-DFA0A04FC94B}">
-              <ma14:wrappingTextBoxFlag xmlns="" xmlns:ma14="http://schemas.microsoft.com/office/mac/drawingml/2011/main" val="1"/>
+              <ma14:wrappingTextBoxFlag xmlns:ma14="http://schemas.microsoft.com/office/mac/drawingml/2011/main" xmlns="" val="1"/>
             </a:ext>
           </a:extLst>
         </p:spPr>
@@ -5454,7 +5451,7 @@
           </a:ln>
           <a:extLst>
             <a:ext uri="{C572A759-6A51-4108-AA02-DFA0A04FC94B}">
-              <ma14:wrappingTextBoxFlag xmlns="" xmlns:ma14="http://schemas.microsoft.com/office/mac/drawingml/2011/main" val="1"/>
+              <ma14:wrappingTextBoxFlag xmlns:ma14="http://schemas.microsoft.com/office/mac/drawingml/2011/main" xmlns="" val="1"/>
             </a:ext>
           </a:extLst>
         </p:spPr>
@@ -5523,7 +5520,7 @@
           </a:ln>
           <a:extLst>
             <a:ext uri="{C572A759-6A51-4108-AA02-DFA0A04FC94B}">
-              <ma14:wrappingTextBoxFlag xmlns="" xmlns:ma14="http://schemas.microsoft.com/office/mac/drawingml/2011/main" val="1"/>
+              <ma14:wrappingTextBoxFlag xmlns:ma14="http://schemas.microsoft.com/office/mac/drawingml/2011/main" xmlns="" val="1"/>
             </a:ext>
           </a:extLst>
         </p:spPr>
@@ -5740,7 +5737,7 @@
           </a:ln>
           <a:extLst>
             <a:ext uri="{C572A759-6A51-4108-AA02-DFA0A04FC94B}">
-              <ma14:wrappingTextBoxFlag xmlns="" xmlns:ma14="http://schemas.microsoft.com/office/mac/drawingml/2011/main" val="1"/>
+              <ma14:wrappingTextBoxFlag xmlns:ma14="http://schemas.microsoft.com/office/mac/drawingml/2011/main" xmlns="" val="1"/>
             </a:ext>
           </a:extLst>
         </p:spPr>
@@ -5809,7 +5806,7 @@
           </a:ln>
           <a:extLst>
             <a:ext uri="{C572A759-6A51-4108-AA02-DFA0A04FC94B}">
-              <ma14:wrappingTextBoxFlag xmlns="" xmlns:ma14="http://schemas.microsoft.com/office/mac/drawingml/2011/main" val="1"/>
+              <ma14:wrappingTextBoxFlag xmlns:ma14="http://schemas.microsoft.com/office/mac/drawingml/2011/main" xmlns="" val="1"/>
             </a:ext>
           </a:extLst>
         </p:spPr>
@@ -6192,7 +6189,7 @@
           </a:ln>
           <a:extLst>
             <a:ext uri="{C572A759-6A51-4108-AA02-DFA0A04FC94B}">
-              <ma14:wrappingTextBoxFlag xmlns="" xmlns:ma14="http://schemas.microsoft.com/office/mac/drawingml/2011/main" val="1"/>
+              <ma14:wrappingTextBoxFlag xmlns:ma14="http://schemas.microsoft.com/office/mac/drawingml/2011/main" xmlns="" val="1"/>
             </a:ext>
           </a:extLst>
         </p:spPr>
@@ -6261,7 +6258,7 @@
           </a:ln>
           <a:extLst>
             <a:ext uri="{C572A759-6A51-4108-AA02-DFA0A04FC94B}">
-              <ma14:wrappingTextBoxFlag xmlns="" xmlns:ma14="http://schemas.microsoft.com/office/mac/drawingml/2011/main" val="1"/>
+              <ma14:wrappingTextBoxFlag xmlns:ma14="http://schemas.microsoft.com/office/mac/drawingml/2011/main" xmlns="" val="1"/>
             </a:ext>
           </a:extLst>
         </p:spPr>
@@ -6604,7 +6601,7 @@
           </a:ln>
           <a:extLst>
             <a:ext uri="{C572A759-6A51-4108-AA02-DFA0A04FC94B}">
-              <ma14:wrappingTextBoxFlag xmlns="" xmlns:ma14="http://schemas.microsoft.com/office/mac/drawingml/2011/main" val="1"/>
+              <ma14:wrappingTextBoxFlag xmlns:ma14="http://schemas.microsoft.com/office/mac/drawingml/2011/main" xmlns="" val="1"/>
             </a:ext>
           </a:extLst>
         </p:spPr>
@@ -6673,7 +6670,7 @@
           </a:ln>
           <a:extLst>
             <a:ext uri="{C572A759-6A51-4108-AA02-DFA0A04FC94B}">
-              <ma14:wrappingTextBoxFlag xmlns="" xmlns:ma14="http://schemas.microsoft.com/office/mac/drawingml/2011/main" val="1"/>
+              <ma14:wrappingTextBoxFlag xmlns:ma14="http://schemas.microsoft.com/office/mac/drawingml/2011/main" xmlns="" val="1"/>
             </a:ext>
           </a:extLst>
         </p:spPr>
@@ -7014,7 +7011,7 @@
           </a:ln>
           <a:extLst>
             <a:ext uri="{C572A759-6A51-4108-AA02-DFA0A04FC94B}">
-              <ma14:wrappingTextBoxFlag xmlns="" xmlns:ma14="http://schemas.microsoft.com/office/mac/drawingml/2011/main" val="1"/>
+              <ma14:wrappingTextBoxFlag xmlns:ma14="http://schemas.microsoft.com/office/mac/drawingml/2011/main" xmlns="" val="1"/>
             </a:ext>
           </a:extLst>
         </p:spPr>
@@ -7051,7 +7048,7 @@
                 </a:uFill>
                 <a:latin typeface="Arial Unicode MS" panose="020B0604020202020204" pitchFamily="34" charset="-128"/>
               </a:rPr>
-              <a:t>Practice queries</a:t>
+              <a:t>REGEXP</a:t>
             </a:r>
             <a:endParaRPr sz="3000" b="1" dirty="0">
               <a:uFill>
@@ -7072,8 +7069,8 @@
         </p:nvSpPr>
         <p:spPr>
           <a:xfrm>
-            <a:off x="179797" y="1324179"/>
-            <a:ext cx="8964203" cy="2695610"/>
+            <a:off x="469900" y="1324179"/>
+            <a:ext cx="8204200" cy="2387833"/>
           </a:xfrm>
           <a:prstGeom prst="rect">
             <a:avLst/>
@@ -7083,21 +7080,23 @@
           </a:ln>
           <a:extLst>
             <a:ext uri="{C572A759-6A51-4108-AA02-DFA0A04FC94B}">
-              <ma14:wrappingTextBoxFlag xmlns="" xmlns:ma14="http://schemas.microsoft.com/office/mac/drawingml/2011/main" val="1"/>
+              <ma14:wrappingTextBoxFlag xmlns:ma14="http://schemas.microsoft.com/office/mac/drawingml/2011/main" xmlns="" val="1"/>
             </a:ext>
           </a:extLst>
         </p:spPr>
         <p:txBody>
-          <a:bodyPr wrap="square" lIns="45719" rIns="45719">
+          <a:bodyPr lIns="45719" rIns="45719">
             <a:spAutoFit/>
           </a:bodyPr>
           <a:lstStyle/>
           <a:p>
-            <a:pPr lvl="0">
+            <a:pPr marL="342900" lvl="0" indent="-342900">
               <a:spcBef>
                 <a:spcPts val="700"/>
               </a:spcBef>
               <a:buSzPct val="100000"/>
+              <a:buFont typeface="Arial" panose="020B0604020202020204" pitchFamily="34" charset="0"/>
+              <a:buChar char="•"/>
               <a:defRPr sz="1800">
                 <a:solidFill>
                   <a:srgbClr val="000000"/>
@@ -7106,6 +7105,18 @@
               </a:defRPr>
             </a:pPr>
             <a:r>
+              <a:rPr lang="en-US" sz="2000" dirty="0">
+                <a:uFill>
+                  <a:solidFill/>
+                </a:uFill>
+                <a:latin typeface="Arial Unicode MS" panose="020B0604020202020204" pitchFamily="34" charset="-128"/>
+                <a:ea typeface="Arial Unicode MS" panose="020B0604020202020204" pitchFamily="34" charset="-128"/>
+                <a:cs typeface="Arial Unicode MS" panose="020B0604020202020204" pitchFamily="34" charset="-128"/>
+                <a:sym typeface="Iowan Old Style Roman"/>
+              </a:rPr>
+              <a:t>REGEXP allows a standard </a:t>
+            </a:r>
+            <a:r>
               <a:rPr lang="en-US" sz="2000" b="1" dirty="0">
                 <a:uFill>
                   <a:solidFill/>
@@ -7115,155 +7126,27 @@
                 <a:cs typeface="Arial Unicode MS" panose="020B0604020202020204" pitchFamily="34" charset="-128"/>
                 <a:sym typeface="Iowan Old Style Roman"/>
               </a:rPr>
-              <a:t>Facebook Queries</a:t>
-            </a:r>
-          </a:p>
-          <a:p>
-            <a:pPr marL="457200" indent="-457200">
+              <a:t>regular expression </a:t>
+            </a:r>
+            <a:r>
+              <a:rPr lang="en-US" sz="2000" dirty="0">
+                <a:uFill>
+                  <a:solidFill/>
+                </a:uFill>
+                <a:latin typeface="Arial Unicode MS" panose="020B0604020202020204" pitchFamily="34" charset="-128"/>
+                <a:ea typeface="Arial Unicode MS" panose="020B0604020202020204" pitchFamily="34" charset="-128"/>
+                <a:cs typeface="Arial Unicode MS" panose="020B0604020202020204" pitchFamily="34" charset="-128"/>
+                <a:sym typeface="Iowan Old Style Roman"/>
+              </a:rPr>
+              <a:t>query</a:t>
+            </a:r>
+          </a:p>
+          <a:p>
+            <a:pPr lvl="1">
               <a:spcBef>
                 <a:spcPts val="700"/>
               </a:spcBef>
               <a:buSzPct val="100000"/>
-              <a:buFont typeface="+mj-lt"/>
-              <a:buAutoNum type="arabicPeriod"/>
-              <a:defRPr sz="1800">
-                <a:solidFill>
-                  <a:srgbClr val="000000"/>
-                </a:solidFill>
-                <a:uFillTx/>
-              </a:defRPr>
-            </a:pPr>
-            <a:r>
-              <a:rPr lang="en-US" sz="2000" dirty="0">
-                <a:uFill>
-                  <a:solidFill/>
-                </a:uFill>
-                <a:latin typeface="Arial Unicode MS" panose="020B0604020202020204" pitchFamily="34" charset="-128"/>
-                <a:ea typeface="Arial Unicode MS" panose="020B0604020202020204" pitchFamily="34" charset="-128"/>
-                <a:cs typeface="Arial Unicode MS" panose="020B0604020202020204" pitchFamily="34" charset="-128"/>
-                <a:sym typeface="Iowan Old Style Roman"/>
-              </a:rPr>
-              <a:t>Find all students who live in “Weinstein Hall”</a:t>
-            </a:r>
-          </a:p>
-          <a:p>
-            <a:pPr marL="457200" indent="-457200">
-              <a:spcBef>
-                <a:spcPts val="700"/>
-              </a:spcBef>
-              <a:buSzPct val="100000"/>
-              <a:buFont typeface="+mj-lt"/>
-              <a:buAutoNum type="arabicPeriod"/>
-              <a:defRPr sz="1800">
-                <a:solidFill>
-                  <a:srgbClr val="000000"/>
-                </a:solidFill>
-                <a:uFillTx/>
-              </a:defRPr>
-            </a:pPr>
-            <a:r>
-              <a:rPr lang="en-US" sz="2000" dirty="0">
-                <a:uFill>
-                  <a:solidFill/>
-                </a:uFill>
-                <a:latin typeface="Arial Unicode MS" panose="020B0604020202020204" pitchFamily="34" charset="-128"/>
-                <a:ea typeface="Arial Unicode MS" panose="020B0604020202020204" pitchFamily="34" charset="-128"/>
-                <a:cs typeface="Arial Unicode MS" panose="020B0604020202020204" pitchFamily="34" charset="-128"/>
-                <a:sym typeface="Iowan Old Style Roman"/>
-              </a:rPr>
-              <a:t>Find all students with first name “Richard”</a:t>
-            </a:r>
-          </a:p>
-          <a:p>
-            <a:pPr marL="457200" indent="-457200">
-              <a:spcBef>
-                <a:spcPts val="700"/>
-              </a:spcBef>
-              <a:buSzPct val="100000"/>
-              <a:buFont typeface="+mj-lt"/>
-              <a:buAutoNum type="arabicPeriod"/>
-              <a:defRPr sz="1800">
-                <a:solidFill>
-                  <a:srgbClr val="000000"/>
-                </a:solidFill>
-                <a:uFillTx/>
-              </a:defRPr>
-            </a:pPr>
-            <a:r>
-              <a:rPr lang="en-US" sz="2000" dirty="0">
-                <a:uFill>
-                  <a:solidFill/>
-                </a:uFill>
-                <a:latin typeface="Arial Unicode MS" panose="020B0604020202020204" pitchFamily="34" charset="-128"/>
-                <a:ea typeface="Arial Unicode MS" panose="020B0604020202020204" pitchFamily="34" charset="-128"/>
-                <a:cs typeface="Arial Unicode MS" panose="020B0604020202020204" pitchFamily="34" charset="-128"/>
-                <a:sym typeface="Iowan Old Style Roman"/>
-              </a:rPr>
-              <a:t>Find all students with first names starting with P and last names starting with I (e.g. </a:t>
-            </a:r>
-            <a:r>
-              <a:rPr lang="en-US" sz="2000" b="1" dirty="0">
-                <a:solidFill>
-                  <a:srgbClr val="C00000"/>
-                </a:solidFill>
-                <a:uFill>
-                  <a:solidFill/>
-                </a:uFill>
-                <a:latin typeface="Arial Unicode MS" panose="020B0604020202020204" pitchFamily="34" charset="-128"/>
-                <a:ea typeface="Arial Unicode MS" panose="020B0604020202020204" pitchFamily="34" charset="-128"/>
-                <a:cs typeface="Arial Unicode MS" panose="020B0604020202020204" pitchFamily="34" charset="-128"/>
-                <a:sym typeface="Iowan Old Style Roman"/>
-              </a:rPr>
-              <a:t>P</a:t>
-            </a:r>
-            <a:r>
-              <a:rPr lang="en-US" sz="2000" dirty="0">
-                <a:uFill>
-                  <a:solidFill/>
-                </a:uFill>
-                <a:latin typeface="Arial Unicode MS" panose="020B0604020202020204" pitchFamily="34" charset="-128"/>
-                <a:ea typeface="Arial Unicode MS" panose="020B0604020202020204" pitchFamily="34" charset="-128"/>
-                <a:cs typeface="Arial Unicode MS" panose="020B0604020202020204" pitchFamily="34" charset="-128"/>
-                <a:sym typeface="Iowan Old Style Roman"/>
-              </a:rPr>
-              <a:t>anos </a:t>
-            </a:r>
-            <a:r>
-              <a:rPr lang="en-US" sz="2000" b="1" dirty="0">
-                <a:solidFill>
-                  <a:srgbClr val="C00000"/>
-                </a:solidFill>
-                <a:uFill>
-                  <a:solidFill/>
-                </a:uFill>
-                <a:latin typeface="Arial Unicode MS" panose="020B0604020202020204" pitchFamily="34" charset="-128"/>
-                <a:ea typeface="Arial Unicode MS" panose="020B0604020202020204" pitchFamily="34" charset="-128"/>
-                <a:cs typeface="Arial Unicode MS" panose="020B0604020202020204" pitchFamily="34" charset="-128"/>
-                <a:sym typeface="Iowan Old Style Roman"/>
-              </a:rPr>
-              <a:t>I</a:t>
-            </a:r>
-            <a:r>
-              <a:rPr lang="en-US" sz="2000" dirty="0">
-                <a:uFill>
-                  <a:solidFill/>
-                </a:uFill>
-                <a:latin typeface="Arial Unicode MS" panose="020B0604020202020204" pitchFamily="34" charset="-128"/>
-                <a:ea typeface="Arial Unicode MS" panose="020B0604020202020204" pitchFamily="34" charset="-128"/>
-                <a:cs typeface="Arial Unicode MS" panose="020B0604020202020204" pitchFamily="34" charset="-128"/>
-                <a:sym typeface="Iowan Old Style Roman"/>
-              </a:rPr>
-              <a:t>peirotis)</a:t>
-            </a:r>
-          </a:p>
-          <a:p>
-            <a:pPr marL="457200" indent="-457200">
-              <a:spcBef>
-                <a:spcPts val="700"/>
-              </a:spcBef>
-              <a:buSzPct val="100000"/>
-              <a:buFont typeface="+mj-lt"/>
-              <a:buAutoNum type="arabicPeriod"/>
               <a:defRPr sz="1800">
                 <a:solidFill>
                   <a:srgbClr val="000000"/>
@@ -7282,7 +7165,7 @@
             </a:endParaRPr>
           </a:p>
           <a:p>
-            <a:pPr>
+            <a:pPr lvl="1">
               <a:spcBef>
                 <a:spcPts val="700"/>
               </a:spcBef>
@@ -7294,22 +7177,103 @@
                 <a:uFillTx/>
               </a:defRPr>
             </a:pPr>
-            <a:endParaRPr lang="en-US" sz="2000" dirty="0">
-              <a:uFill>
-                <a:solidFill/>
-              </a:uFill>
-              <a:latin typeface="Arial Unicode MS" panose="020B0604020202020204" pitchFamily="34" charset="-128"/>
-              <a:ea typeface="Arial Unicode MS" panose="020B0604020202020204" pitchFamily="34" charset="-128"/>
-              <a:cs typeface="Arial Unicode MS" panose="020B0604020202020204" pitchFamily="34" charset="-128"/>
-              <a:sym typeface="Iowan Old Style Roman"/>
-            </a:endParaRPr>
+            <a:r>
+              <a:rPr lang="en-US" sz="2000" b="1" dirty="0">
+                <a:uFill>
+                  <a:solidFill/>
+                </a:uFill>
+                <a:latin typeface="Arial Unicode MS" panose="020B0604020202020204" pitchFamily="34" charset="-128"/>
+                <a:ea typeface="Arial Unicode MS" panose="020B0604020202020204" pitchFamily="34" charset="-128"/>
+                <a:cs typeface="Arial Unicode MS" panose="020B0604020202020204" pitchFamily="34" charset="-128"/>
+                <a:sym typeface="Iowan Old Style Roman"/>
+              </a:rPr>
+              <a:t>Example: Find all names that contain a digit</a:t>
+            </a:r>
+          </a:p>
+          <a:p>
+            <a:pPr lvl="1">
+              <a:spcBef>
+                <a:spcPts val="700"/>
+              </a:spcBef>
+              <a:buSzPct val="100000"/>
+              <a:defRPr sz="1800">
+                <a:solidFill>
+                  <a:srgbClr val="000000"/>
+                </a:solidFill>
+                <a:uFillTx/>
+              </a:defRPr>
+            </a:pPr>
+            <a:r>
+              <a:rPr lang="en-US" sz="2000" dirty="0">
+                <a:uFill>
+                  <a:solidFill/>
+                </a:uFill>
+                <a:latin typeface="Arial Unicode MS" panose="020B0604020202020204" pitchFamily="34" charset="-128"/>
+                <a:ea typeface="Arial Unicode MS" panose="020B0604020202020204" pitchFamily="34" charset="-128"/>
+                <a:cs typeface="Arial Unicode MS" panose="020B0604020202020204" pitchFamily="34" charset="-128"/>
+                <a:sym typeface="Iowan Old Style Roman"/>
+              </a:rPr>
+              <a:t>SELECT * </a:t>
+            </a:r>
+          </a:p>
+          <a:p>
+            <a:pPr lvl="1">
+              <a:spcBef>
+                <a:spcPts val="700"/>
+              </a:spcBef>
+              <a:buSzPct val="100000"/>
+              <a:defRPr sz="1800">
+                <a:solidFill>
+                  <a:srgbClr val="000000"/>
+                </a:solidFill>
+                <a:uFillTx/>
+              </a:defRPr>
+            </a:pPr>
+            <a:r>
+              <a:rPr lang="en-US" sz="2000" dirty="0">
+                <a:uFill>
+                  <a:solidFill/>
+                </a:uFill>
+                <a:latin typeface="Arial Unicode MS" panose="020B0604020202020204" pitchFamily="34" charset="-128"/>
+                <a:ea typeface="Arial Unicode MS" panose="020B0604020202020204" pitchFamily="34" charset="-128"/>
+                <a:cs typeface="Arial Unicode MS" panose="020B0604020202020204" pitchFamily="34" charset="-128"/>
+                <a:sym typeface="Iowan Old Style Roman"/>
+              </a:rPr>
+              <a:t>FROM Profiles </a:t>
+            </a:r>
+          </a:p>
+          <a:p>
+            <a:pPr lvl="1">
+              <a:spcBef>
+                <a:spcPts val="700"/>
+              </a:spcBef>
+              <a:buSzPct val="100000"/>
+              <a:defRPr sz="1800">
+                <a:solidFill>
+                  <a:srgbClr val="000000"/>
+                </a:solidFill>
+                <a:uFillTx/>
+              </a:defRPr>
+            </a:pPr>
+            <a:r>
+              <a:rPr lang="en-US" sz="2000" dirty="0">
+                <a:uFill>
+                  <a:solidFill/>
+                </a:uFill>
+                <a:latin typeface="Arial Unicode MS" panose="020B0604020202020204" pitchFamily="34" charset="-128"/>
+                <a:ea typeface="Arial Unicode MS" panose="020B0604020202020204" pitchFamily="34" charset="-128"/>
+                <a:cs typeface="Arial Unicode MS" panose="020B0604020202020204" pitchFamily="34" charset="-128"/>
+                <a:sym typeface="Iowan Old Style Roman"/>
+              </a:rPr>
+              <a:t>WHERE name REGEXP '[0-9]+'</a:t>
+            </a:r>
           </a:p>
         </p:txBody>
       </p:sp>
     </p:spTree>
     <p:extLst>
       <p:ext uri="{BB962C8B-B14F-4D97-AF65-F5344CB8AC3E}">
-        <p14:creationId xmlns:p14="http://schemas.microsoft.com/office/powerpoint/2010/main" val="2225769499"/>
+        <p14:creationId xmlns:p14="http://schemas.microsoft.com/office/powerpoint/2010/main" val="4128063083"/>
       </p:ext>
     </p:extLst>
   </p:cSld>
@@ -7339,534 +7303,68 @@
       </p:grpSpPr>
       <p:sp>
         <p:nvSpPr>
-          <p:cNvPr id="44" name="Shape 44"/>
+          <p:cNvPr id="2" name="Rectangle 1">
+            <a:extLst>
+              <a:ext uri="{FF2B5EF4-FFF2-40B4-BE49-F238E27FC236}">
+                <a16:creationId xmlns:a16="http://schemas.microsoft.com/office/drawing/2014/main" id="{7148B51A-A7D0-4EB3-97C5-23CDCE187BB7}"/>
+              </a:ext>
+            </a:extLst>
+          </p:cNvPr>
           <p:cNvSpPr/>
           <p:nvPr/>
         </p:nvSpPr>
         <p:spPr>
           <a:xfrm>
-            <a:off x="386308" y="147496"/>
-            <a:ext cx="7757379" cy="553998"/>
+            <a:off x="1025235" y="1277173"/>
+            <a:ext cx="7342909" cy="4031873"/>
           </a:xfrm>
           <a:prstGeom prst="rect">
             <a:avLst/>
           </a:prstGeom>
-          <a:ln w="12700">
-            <a:miter lim="400000"/>
-          </a:ln>
-          <a:extLst>
-            <a:ext uri="{C572A759-6A51-4108-AA02-DFA0A04FC94B}">
-              <ma14:wrappingTextBoxFlag xmlns="" xmlns:ma14="http://schemas.microsoft.com/office/mac/drawingml/2011/main" val="1"/>
-            </a:ext>
-          </a:extLst>
         </p:spPr>
         <p:txBody>
-          <a:bodyPr lIns="45719" rIns="45719">
-            <a:spAutoFit/>
-          </a:bodyPr>
-          <a:lstStyle>
-            <a:lvl1pPr>
-              <a:defRPr sz="3000" b="1">
-                <a:uFill>
-                  <a:solidFill>
-                    <a:srgbClr val="FFFFFF"/>
-                  </a:solidFill>
-                </a:uFill>
-              </a:defRPr>
-            </a:lvl1pPr>
-          </a:lstStyle>
-          <a:p>
-            <a:pPr lvl="0">
-              <a:defRPr sz="1800" b="0">
-                <a:solidFill>
-                  <a:srgbClr val="000000"/>
-                </a:solidFill>
-                <a:uFillTx/>
-              </a:defRPr>
-            </a:pPr>
-            <a:r>
-              <a:rPr sz="3000" b="1" dirty="0">
-                <a:uFill>
-                  <a:solidFill>
-                    <a:srgbClr val="FFFFFF"/>
-                  </a:solidFill>
-                </a:uFill>
-                <a:latin typeface="Arial Unicode MS" panose="020B0604020202020204" pitchFamily="34" charset="-128"/>
-              </a:rPr>
-              <a:t>Practice </a:t>
-            </a:r>
-            <a:r>
-              <a:rPr lang="en-US" sz="3000" b="1" dirty="0">
-                <a:uFill>
-                  <a:solidFill>
-                    <a:srgbClr val="FFFFFF"/>
-                  </a:solidFill>
-                </a:uFill>
-                <a:latin typeface="Arial Unicode MS" panose="020B0604020202020204" pitchFamily="34" charset="-128"/>
-              </a:rPr>
-              <a:t>q</a:t>
-            </a:r>
-            <a:r>
-              <a:rPr sz="3000" b="1" dirty="0">
-                <a:uFill>
-                  <a:solidFill>
-                    <a:srgbClr val="FFFFFF"/>
-                  </a:solidFill>
-                </a:uFill>
-                <a:latin typeface="Arial Unicode MS" panose="020B0604020202020204" pitchFamily="34" charset="-128"/>
-              </a:rPr>
-              <a:t>ueries</a:t>
-            </a:r>
-          </a:p>
-        </p:txBody>
-      </p:sp>
-      <p:sp>
-        <p:nvSpPr>
-          <p:cNvPr id="45" name="Shape 45"/>
-          <p:cNvSpPr/>
-          <p:nvPr/>
-        </p:nvSpPr>
-        <p:spPr>
-          <a:xfrm>
-            <a:off x="469899" y="1324179"/>
-            <a:ext cx="8432657" cy="2516073"/>
-          </a:xfrm>
-          <a:prstGeom prst="rect">
-            <a:avLst/>
-          </a:prstGeom>
-          <a:ln w="12700">
-            <a:miter lim="400000"/>
-          </a:ln>
-          <a:extLst>
-            <a:ext uri="{C572A759-6A51-4108-AA02-DFA0A04FC94B}">
-              <ma14:wrappingTextBoxFlag xmlns="" xmlns:ma14="http://schemas.microsoft.com/office/mac/drawingml/2011/main" val="1"/>
-            </a:ext>
-          </a:extLst>
-        </p:spPr>
-        <p:txBody>
-          <a:bodyPr wrap="square" lIns="45719" rIns="45719">
+          <a:bodyPr wrap="square">
             <a:spAutoFit/>
           </a:bodyPr>
           <a:lstStyle/>
           <a:p>
-            <a:pPr marL="267368" lvl="0" indent="-267368">
-              <a:spcBef>
-                <a:spcPts val="700"/>
-              </a:spcBef>
-              <a:buSzPct val="100000"/>
-              <a:buAutoNum type="arabicPeriod"/>
-              <a:defRPr sz="1800">
-                <a:solidFill>
-                  <a:srgbClr val="000000"/>
-                </a:solidFill>
-                <a:uFillTx/>
-              </a:defRPr>
-            </a:pPr>
-            <a:r>
-              <a:rPr lang="en-US" sz="2000" dirty="0">
-                <a:uFill>
-                  <a:solidFill/>
-                </a:uFill>
-                <a:latin typeface="Arial Unicode MS" panose="020B0604020202020204" pitchFamily="34" charset="-128"/>
-                <a:ea typeface="Arial Unicode MS" panose="020B0604020202020204" pitchFamily="34" charset="-128"/>
-                <a:cs typeface="Arial Unicode MS" panose="020B0604020202020204" pitchFamily="34" charset="-128"/>
-                <a:sym typeface="Iowan Old Style Roman"/>
-              </a:rPr>
-              <a:t>Get the names and sex of all liberal students</a:t>
-            </a:r>
-          </a:p>
-          <a:p>
-            <a:pPr marL="267368" lvl="0" indent="-267368">
-              <a:spcBef>
-                <a:spcPts val="700"/>
-              </a:spcBef>
-              <a:buSzPct val="100000"/>
-              <a:buAutoNum type="arabicPeriod"/>
-              <a:defRPr sz="1800">
-                <a:solidFill>
-                  <a:srgbClr val="000000"/>
-                </a:solidFill>
-                <a:uFillTx/>
-              </a:defRPr>
-            </a:pPr>
-            <a:r>
-              <a:rPr lang="en-US" sz="2000" dirty="0">
-                <a:uFill>
-                  <a:solidFill/>
-                </a:uFill>
-                <a:latin typeface="Arial Unicode MS" panose="020B0604020202020204" pitchFamily="34" charset="-128"/>
-                <a:ea typeface="Arial Unicode MS" panose="020B0604020202020204" pitchFamily="34" charset="-128"/>
-                <a:cs typeface="Arial Unicode MS" panose="020B0604020202020204" pitchFamily="34" charset="-128"/>
-                <a:sym typeface="Iowan Old Style Roman"/>
-              </a:rPr>
-              <a:t>Get the names, sex, and political views of liberal and very liberal students</a:t>
-            </a:r>
-          </a:p>
-          <a:p>
-            <a:pPr marL="267368" lvl="0" indent="-267368">
-              <a:spcBef>
-                <a:spcPts val="700"/>
-              </a:spcBef>
-              <a:buSzPct val="100000"/>
-              <a:buAutoNum type="arabicPeriod"/>
-              <a:defRPr sz="1800">
-                <a:solidFill>
-                  <a:srgbClr val="000000"/>
-                </a:solidFill>
-                <a:uFillTx/>
-              </a:defRPr>
-            </a:pPr>
-            <a:r>
-              <a:rPr lang="en-US" sz="2000" dirty="0">
-                <a:uFill>
-                  <a:solidFill/>
-                </a:uFill>
-                <a:latin typeface="Arial Unicode MS" panose="020B0604020202020204" pitchFamily="34" charset="-128"/>
-                <a:ea typeface="Arial Unicode MS" panose="020B0604020202020204" pitchFamily="34" charset="-128"/>
-                <a:cs typeface="Arial Unicode MS" panose="020B0604020202020204" pitchFamily="34" charset="-128"/>
-                <a:sym typeface="Iowan Old Style Roman"/>
-              </a:rPr>
-              <a:t>Find all possible values for the “Residence” attribute in Profiles, eliminating duplicates. Make the limit 10,000 so that you can see all entries</a:t>
-            </a:r>
-          </a:p>
-          <a:p>
-            <a:pPr lvl="0">
-              <a:spcBef>
-                <a:spcPts val="700"/>
-              </a:spcBef>
-              <a:buSzPct val="100000"/>
-              <a:defRPr sz="1800">
-                <a:solidFill>
-                  <a:srgbClr val="000000"/>
-                </a:solidFill>
-                <a:uFillTx/>
-              </a:defRPr>
-            </a:pPr>
-            <a:endParaRPr lang="en-US" sz="2000" dirty="0">
-              <a:uFill>
-                <a:solidFill/>
-              </a:uFill>
-              <a:latin typeface="Arial Unicode MS" panose="020B0604020202020204" pitchFamily="34" charset="-128"/>
-              <a:ea typeface="Arial Unicode MS" panose="020B0604020202020204" pitchFamily="34" charset="-128"/>
-              <a:cs typeface="Arial Unicode MS" panose="020B0604020202020204" pitchFamily="34" charset="-128"/>
-              <a:sym typeface="Iowan Old Style Roman"/>
-            </a:endParaRPr>
+            <a:r>
+              <a:rPr lang="en-US" sz="3200" dirty="0"/>
+              <a:t>Go to the Facebook database</a:t>
+            </a:r>
+          </a:p>
+          <a:p>
+            <a:endParaRPr lang="en-US" sz="3200" dirty="0"/>
+          </a:p>
+          <a:p>
+            <a:r>
+              <a:rPr lang="en-US" sz="3200" dirty="0"/>
+              <a:t>Find all the students that have New York as the home state. </a:t>
+            </a:r>
+          </a:p>
+          <a:p>
+            <a:endParaRPr lang="en-US" sz="3200" dirty="0"/>
+          </a:p>
+          <a:p>
+            <a:r>
+              <a:rPr lang="en-US" sz="3200" dirty="0"/>
+              <a:t>Deal with all the different ways that students have written New York in the “</a:t>
+            </a:r>
+            <a:r>
+              <a:rPr lang="en-US" sz="3200" dirty="0" err="1"/>
+              <a:t>HomeState</a:t>
+            </a:r>
+            <a:r>
+              <a:rPr lang="en-US" sz="3200" dirty="0"/>
+              <a:t>” attribute</a:t>
+            </a:r>
           </a:p>
         </p:txBody>
       </p:sp>
     </p:spTree>
     <p:extLst>
       <p:ext uri="{BB962C8B-B14F-4D97-AF65-F5344CB8AC3E}">
-        <p14:creationId xmlns:p14="http://schemas.microsoft.com/office/powerpoint/2010/main" val="1707215419"/>
-      </p:ext>
-    </p:extLst>
-  </p:cSld>
-  <p:clrMapOvr>
-    <a:masterClrMapping/>
-  </p:clrMapOvr>
-  <p:transition spd="med"/>
-</p:sld>
-</file>
-
-<file path=ppt/slides/slide19.xml><?xml version="1.0" encoding="utf-8"?>
-<p:sld xmlns:a="http://schemas.openxmlformats.org/drawingml/2006/main" xmlns:r="http://schemas.openxmlformats.org/officeDocument/2006/relationships" xmlns:p="http://schemas.openxmlformats.org/presentationml/2006/main">
-  <p:cSld>
-    <p:spTree>
-      <p:nvGrpSpPr>
-        <p:cNvPr id="1" name=""/>
-        <p:cNvGrpSpPr/>
-        <p:nvPr/>
-      </p:nvGrpSpPr>
-      <p:grpSpPr>
-        <a:xfrm>
-          <a:off x="0" y="0"/>
-          <a:ext cx="0" cy="0"/>
-          <a:chOff x="0" y="0"/>
-          <a:chExt cx="0" cy="0"/>
-        </a:xfrm>
-      </p:grpSpPr>
-      <p:sp>
-        <p:nvSpPr>
-          <p:cNvPr id="44" name="Shape 44"/>
-          <p:cNvSpPr/>
-          <p:nvPr/>
-        </p:nvSpPr>
-        <p:spPr>
-          <a:xfrm>
-            <a:off x="386308" y="147496"/>
-            <a:ext cx="7757379" cy="553998"/>
-          </a:xfrm>
-          <a:prstGeom prst="rect">
-            <a:avLst/>
-          </a:prstGeom>
-          <a:ln w="12700">
-            <a:miter lim="400000"/>
-          </a:ln>
-          <a:extLst>
-            <a:ext uri="{C572A759-6A51-4108-AA02-DFA0A04FC94B}">
-              <ma14:wrappingTextBoxFlag xmlns="" xmlns:ma14="http://schemas.microsoft.com/office/mac/drawingml/2011/main" val="1"/>
-            </a:ext>
-          </a:extLst>
-        </p:spPr>
-        <p:txBody>
-          <a:bodyPr lIns="45719" rIns="45719">
-            <a:spAutoFit/>
-          </a:bodyPr>
-          <a:lstStyle>
-            <a:lvl1pPr>
-              <a:defRPr sz="3000" b="1">
-                <a:uFill>
-                  <a:solidFill>
-                    <a:srgbClr val="FFFFFF"/>
-                  </a:solidFill>
-                </a:uFill>
-              </a:defRPr>
-            </a:lvl1pPr>
-          </a:lstStyle>
-          <a:p>
-            <a:pPr lvl="0">
-              <a:defRPr sz="1800" b="0">
-                <a:solidFill>
-                  <a:srgbClr val="000000"/>
-                </a:solidFill>
-                <a:uFillTx/>
-              </a:defRPr>
-            </a:pPr>
-            <a:r>
-              <a:rPr lang="en-US" sz="3000" b="1" dirty="0">
-                <a:uFill>
-                  <a:solidFill>
-                    <a:srgbClr val="FFFFFF"/>
-                  </a:solidFill>
-                </a:uFill>
-                <a:latin typeface="Arial Unicode MS" panose="020B0604020202020204" pitchFamily="34" charset="-128"/>
-              </a:rPr>
-              <a:t>REGEXP</a:t>
-            </a:r>
-            <a:endParaRPr sz="3000" b="1" dirty="0">
-              <a:uFill>
-                <a:solidFill>
-                  <a:srgbClr val="FFFFFF"/>
-                </a:solidFill>
-              </a:uFill>
-              <a:latin typeface="Arial Unicode MS" panose="020B0604020202020204" pitchFamily="34" charset="-128"/>
-            </a:endParaRPr>
-          </a:p>
-        </p:txBody>
-      </p:sp>
-      <p:sp>
-        <p:nvSpPr>
-          <p:cNvPr id="45" name="Shape 45"/>
-          <p:cNvSpPr/>
-          <p:nvPr/>
-        </p:nvSpPr>
-        <p:spPr>
-          <a:xfrm>
-            <a:off x="469900" y="1324179"/>
-            <a:ext cx="8204200" cy="2387833"/>
-          </a:xfrm>
-          <a:prstGeom prst="rect">
-            <a:avLst/>
-          </a:prstGeom>
-          <a:ln w="12700">
-            <a:miter lim="400000"/>
-          </a:ln>
-          <a:extLst>
-            <a:ext uri="{C572A759-6A51-4108-AA02-DFA0A04FC94B}">
-              <ma14:wrappingTextBoxFlag xmlns="" xmlns:ma14="http://schemas.microsoft.com/office/mac/drawingml/2011/main" val="1"/>
-            </a:ext>
-          </a:extLst>
-        </p:spPr>
-        <p:txBody>
-          <a:bodyPr lIns="45719" rIns="45719">
-            <a:spAutoFit/>
-          </a:bodyPr>
-          <a:lstStyle/>
-          <a:p>
-            <a:pPr marL="342900" lvl="0" indent="-342900">
-              <a:spcBef>
-                <a:spcPts val="700"/>
-              </a:spcBef>
-              <a:buSzPct val="100000"/>
-              <a:buFont typeface="Arial" panose="020B0604020202020204" pitchFamily="34" charset="0"/>
-              <a:buChar char="•"/>
-              <a:defRPr sz="1800">
-                <a:solidFill>
-                  <a:srgbClr val="000000"/>
-                </a:solidFill>
-                <a:uFillTx/>
-              </a:defRPr>
-            </a:pPr>
-            <a:r>
-              <a:rPr lang="en-US" sz="2000" dirty="0">
-                <a:uFill>
-                  <a:solidFill/>
-                </a:uFill>
-                <a:latin typeface="Arial Unicode MS" panose="020B0604020202020204" pitchFamily="34" charset="-128"/>
-                <a:ea typeface="Arial Unicode MS" panose="020B0604020202020204" pitchFamily="34" charset="-128"/>
-                <a:cs typeface="Arial Unicode MS" panose="020B0604020202020204" pitchFamily="34" charset="-128"/>
-                <a:sym typeface="Iowan Old Style Roman"/>
-              </a:rPr>
-              <a:t>REGEXP allows a standard </a:t>
-            </a:r>
-            <a:r>
-              <a:rPr lang="en-US" sz="2000" b="1" dirty="0">
-                <a:uFill>
-                  <a:solidFill/>
-                </a:uFill>
-                <a:latin typeface="Arial Unicode MS" panose="020B0604020202020204" pitchFamily="34" charset="-128"/>
-                <a:ea typeface="Arial Unicode MS" panose="020B0604020202020204" pitchFamily="34" charset="-128"/>
-                <a:cs typeface="Arial Unicode MS" panose="020B0604020202020204" pitchFamily="34" charset="-128"/>
-                <a:sym typeface="Iowan Old Style Roman"/>
-              </a:rPr>
-              <a:t>regular expression </a:t>
-            </a:r>
-            <a:r>
-              <a:rPr lang="en-US" sz="2000" dirty="0">
-                <a:uFill>
-                  <a:solidFill/>
-                </a:uFill>
-                <a:latin typeface="Arial Unicode MS" panose="020B0604020202020204" pitchFamily="34" charset="-128"/>
-                <a:ea typeface="Arial Unicode MS" panose="020B0604020202020204" pitchFamily="34" charset="-128"/>
-                <a:cs typeface="Arial Unicode MS" panose="020B0604020202020204" pitchFamily="34" charset="-128"/>
-                <a:sym typeface="Iowan Old Style Roman"/>
-              </a:rPr>
-              <a:t>query</a:t>
-            </a:r>
-          </a:p>
-          <a:p>
-            <a:pPr lvl="1">
-              <a:spcBef>
-                <a:spcPts val="700"/>
-              </a:spcBef>
-              <a:buSzPct val="100000"/>
-              <a:defRPr sz="1800">
-                <a:solidFill>
-                  <a:srgbClr val="000000"/>
-                </a:solidFill>
-                <a:uFillTx/>
-              </a:defRPr>
-            </a:pPr>
-            <a:endParaRPr lang="en-US" sz="2000" dirty="0">
-              <a:uFill>
-                <a:solidFill/>
-              </a:uFill>
-              <a:latin typeface="Arial Unicode MS" panose="020B0604020202020204" pitchFamily="34" charset="-128"/>
-              <a:ea typeface="Arial Unicode MS" panose="020B0604020202020204" pitchFamily="34" charset="-128"/>
-              <a:cs typeface="Arial Unicode MS" panose="020B0604020202020204" pitchFamily="34" charset="-128"/>
-              <a:sym typeface="Iowan Old Style Roman"/>
-            </a:endParaRPr>
-          </a:p>
-          <a:p>
-            <a:pPr lvl="1">
-              <a:spcBef>
-                <a:spcPts val="700"/>
-              </a:spcBef>
-              <a:buSzPct val="100000"/>
-              <a:defRPr sz="1800">
-                <a:solidFill>
-                  <a:srgbClr val="000000"/>
-                </a:solidFill>
-                <a:uFillTx/>
-              </a:defRPr>
-            </a:pPr>
-            <a:r>
-              <a:rPr lang="en-US" sz="2000" b="1" dirty="0">
-                <a:uFill>
-                  <a:solidFill/>
-                </a:uFill>
-                <a:latin typeface="Arial Unicode MS" panose="020B0604020202020204" pitchFamily="34" charset="-128"/>
-                <a:ea typeface="Arial Unicode MS" panose="020B0604020202020204" pitchFamily="34" charset="-128"/>
-                <a:cs typeface="Arial Unicode MS" panose="020B0604020202020204" pitchFamily="34" charset="-128"/>
-                <a:sym typeface="Iowan Old Style Roman"/>
-              </a:rPr>
-              <a:t>Example: Find all names that contain a digit</a:t>
-            </a:r>
-          </a:p>
-          <a:p>
-            <a:pPr lvl="1">
-              <a:spcBef>
-                <a:spcPts val="700"/>
-              </a:spcBef>
-              <a:buSzPct val="100000"/>
-              <a:defRPr sz="1800">
-                <a:solidFill>
-                  <a:srgbClr val="000000"/>
-                </a:solidFill>
-                <a:uFillTx/>
-              </a:defRPr>
-            </a:pPr>
-            <a:r>
-              <a:rPr lang="en-US" sz="2000" dirty="0">
-                <a:uFill>
-                  <a:solidFill/>
-                </a:uFill>
-                <a:latin typeface="Arial Unicode MS" panose="020B0604020202020204" pitchFamily="34" charset="-128"/>
-                <a:ea typeface="Arial Unicode MS" panose="020B0604020202020204" pitchFamily="34" charset="-128"/>
-                <a:cs typeface="Arial Unicode MS" panose="020B0604020202020204" pitchFamily="34" charset="-128"/>
-                <a:sym typeface="Iowan Old Style Roman"/>
-              </a:rPr>
-              <a:t>SELECT * </a:t>
-            </a:r>
-          </a:p>
-          <a:p>
-            <a:pPr lvl="1">
-              <a:spcBef>
-                <a:spcPts val="700"/>
-              </a:spcBef>
-              <a:buSzPct val="100000"/>
-              <a:defRPr sz="1800">
-                <a:solidFill>
-                  <a:srgbClr val="000000"/>
-                </a:solidFill>
-                <a:uFillTx/>
-              </a:defRPr>
-            </a:pPr>
-            <a:r>
-              <a:rPr lang="en-US" sz="2000" dirty="0">
-                <a:uFill>
-                  <a:solidFill/>
-                </a:uFill>
-                <a:latin typeface="Arial Unicode MS" panose="020B0604020202020204" pitchFamily="34" charset="-128"/>
-                <a:ea typeface="Arial Unicode MS" panose="020B0604020202020204" pitchFamily="34" charset="-128"/>
-                <a:cs typeface="Arial Unicode MS" panose="020B0604020202020204" pitchFamily="34" charset="-128"/>
-                <a:sym typeface="Iowan Old Style Roman"/>
-              </a:rPr>
-              <a:t>FROM Profiles </a:t>
-            </a:r>
-          </a:p>
-          <a:p>
-            <a:pPr lvl="1">
-              <a:spcBef>
-                <a:spcPts val="700"/>
-              </a:spcBef>
-              <a:buSzPct val="100000"/>
-              <a:defRPr sz="1800">
-                <a:solidFill>
-                  <a:srgbClr val="000000"/>
-                </a:solidFill>
-                <a:uFillTx/>
-              </a:defRPr>
-            </a:pPr>
-            <a:r>
-              <a:rPr lang="en-US" sz="2000" dirty="0">
-                <a:uFill>
-                  <a:solidFill/>
-                </a:uFill>
-                <a:latin typeface="Arial Unicode MS" panose="020B0604020202020204" pitchFamily="34" charset="-128"/>
-                <a:ea typeface="Arial Unicode MS" panose="020B0604020202020204" pitchFamily="34" charset="-128"/>
-                <a:cs typeface="Arial Unicode MS" panose="020B0604020202020204" pitchFamily="34" charset="-128"/>
-                <a:sym typeface="Iowan Old Style Roman"/>
-              </a:rPr>
-              <a:t>WHERE name REGEXP '[0-9]+'</a:t>
-            </a:r>
-          </a:p>
-        </p:txBody>
-      </p:sp>
-    </p:spTree>
-    <p:extLst>
-      <p:ext uri="{BB962C8B-B14F-4D97-AF65-F5344CB8AC3E}">
-        <p14:creationId xmlns:p14="http://schemas.microsoft.com/office/powerpoint/2010/main" val="4128063083"/>
+        <p14:creationId xmlns:p14="http://schemas.microsoft.com/office/powerpoint/2010/main" val="1059645985"/>
       </p:ext>
     </p:extLst>
   </p:cSld>
@@ -7913,7 +7411,7 @@
           </a:ln>
           <a:extLst>
             <a:ext uri="{C572A759-6A51-4108-AA02-DFA0A04FC94B}">
-              <ma14:wrappingTextBoxFlag xmlns="" xmlns:ma14="http://schemas.microsoft.com/office/mac/drawingml/2011/main" val="1"/>
+              <ma14:wrappingTextBoxFlag xmlns:ma14="http://schemas.microsoft.com/office/mac/drawingml/2011/main" xmlns="" val="1"/>
             </a:ext>
           </a:extLst>
         </p:spPr>
@@ -7993,7 +7491,7 @@
           </a:ln>
           <a:extLst>
             <a:ext uri="{C572A759-6A51-4108-AA02-DFA0A04FC94B}">
-              <ma14:wrappingTextBoxFlag xmlns="" xmlns:ma14="http://schemas.microsoft.com/office/mac/drawingml/2011/main" val="1"/>
+              <ma14:wrappingTextBoxFlag xmlns:ma14="http://schemas.microsoft.com/office/mac/drawingml/2011/main" xmlns="" val="1"/>
             </a:ext>
           </a:extLst>
         </p:spPr>
@@ -8401,7 +7899,7 @@
           </a:ln>
           <a:extLst>
             <a:ext uri="{C572A759-6A51-4108-AA02-DFA0A04FC94B}">
-              <ma14:wrappingTextBoxFlag xmlns="" xmlns:ma14="http://schemas.microsoft.com/office/mac/drawingml/2011/main" val="1"/>
+              <ma14:wrappingTextBoxFlag xmlns:ma14="http://schemas.microsoft.com/office/mac/drawingml/2011/main" xmlns="" val="1"/>
             </a:ext>
           </a:extLst>
         </p:spPr>
@@ -8589,428 +8087,6 @@
 </p:sld>
 </file>
 
-<file path=ppt/slides/slide20.xml><?xml version="1.0" encoding="utf-8"?>
-<p:sld xmlns:a="http://schemas.openxmlformats.org/drawingml/2006/main" xmlns:r="http://schemas.openxmlformats.org/officeDocument/2006/relationships" xmlns:p="http://schemas.openxmlformats.org/presentationml/2006/main">
-  <p:cSld>
-    <p:spTree>
-      <p:nvGrpSpPr>
-        <p:cNvPr id="1" name=""/>
-        <p:cNvGrpSpPr/>
-        <p:nvPr/>
-      </p:nvGrpSpPr>
-      <p:grpSpPr>
-        <a:xfrm>
-          <a:off x="0" y="0"/>
-          <a:ext cx="0" cy="0"/>
-          <a:chOff x="0" y="0"/>
-          <a:chExt cx="0" cy="0"/>
-        </a:xfrm>
-      </p:grpSpPr>
-      <p:sp>
-        <p:nvSpPr>
-          <p:cNvPr id="44" name="Shape 44"/>
-          <p:cNvSpPr/>
-          <p:nvPr/>
-        </p:nvSpPr>
-        <p:spPr>
-          <a:xfrm>
-            <a:off x="386308" y="147496"/>
-            <a:ext cx="7757379" cy="553998"/>
-          </a:xfrm>
-          <a:prstGeom prst="rect">
-            <a:avLst/>
-          </a:prstGeom>
-          <a:ln w="12700">
-            <a:miter lim="400000"/>
-          </a:ln>
-          <a:extLst>
-            <a:ext uri="{C572A759-6A51-4108-AA02-DFA0A04FC94B}">
-              <ma14:wrappingTextBoxFlag xmlns="" xmlns:ma14="http://schemas.microsoft.com/office/mac/drawingml/2011/main" val="1"/>
-            </a:ext>
-          </a:extLst>
-        </p:spPr>
-        <p:txBody>
-          <a:bodyPr lIns="45719" rIns="45719">
-            <a:spAutoFit/>
-          </a:bodyPr>
-          <a:lstStyle>
-            <a:lvl1pPr>
-              <a:defRPr sz="3000" b="1">
-                <a:uFill>
-                  <a:solidFill>
-                    <a:srgbClr val="FFFFFF"/>
-                  </a:solidFill>
-                </a:uFill>
-              </a:defRPr>
-            </a:lvl1pPr>
-          </a:lstStyle>
-          <a:p>
-            <a:pPr lvl="0">
-              <a:defRPr sz="1800" b="0">
-                <a:solidFill>
-                  <a:srgbClr val="000000"/>
-                </a:solidFill>
-                <a:uFillTx/>
-              </a:defRPr>
-            </a:pPr>
-            <a:r>
-              <a:rPr sz="3000" b="1" dirty="0">
-                <a:uFill>
-                  <a:solidFill>
-                    <a:srgbClr val="FFFFFF"/>
-                  </a:solidFill>
-                </a:uFill>
-                <a:latin typeface="Arial Unicode MS" panose="020B0604020202020204" pitchFamily="34" charset="-128"/>
-              </a:rPr>
-              <a:t>Practice queries</a:t>
-            </a:r>
-          </a:p>
-        </p:txBody>
-      </p:sp>
-      <p:sp>
-        <p:nvSpPr>
-          <p:cNvPr id="45" name="Shape 45"/>
-          <p:cNvSpPr/>
-          <p:nvPr/>
-        </p:nvSpPr>
-        <p:spPr>
-          <a:xfrm>
-            <a:off x="469899" y="1324179"/>
-            <a:ext cx="8432657" cy="400110"/>
-          </a:xfrm>
-          <a:prstGeom prst="rect">
-            <a:avLst/>
-          </a:prstGeom>
-          <a:ln w="12700">
-            <a:miter lim="400000"/>
-          </a:ln>
-          <a:extLst>
-            <a:ext uri="{C572A759-6A51-4108-AA02-DFA0A04FC94B}">
-              <ma14:wrappingTextBoxFlag xmlns="" xmlns:ma14="http://schemas.microsoft.com/office/mac/drawingml/2011/main" val="1"/>
-            </a:ext>
-          </a:extLst>
-        </p:spPr>
-        <p:txBody>
-          <a:bodyPr wrap="square" lIns="45719" rIns="45719">
-            <a:spAutoFit/>
-          </a:bodyPr>
-          <a:lstStyle/>
-          <a:p>
-            <a:pPr marL="267368" lvl="0" indent="-267368">
-              <a:spcBef>
-                <a:spcPts val="700"/>
-              </a:spcBef>
-              <a:buSzPct val="100000"/>
-              <a:buAutoNum type="arabicPeriod"/>
-              <a:defRPr sz="1800">
-                <a:solidFill>
-                  <a:srgbClr val="000000"/>
-                </a:solidFill>
-                <a:uFillTx/>
-              </a:defRPr>
-            </a:pPr>
-            <a:endParaRPr lang="en-US" sz="2000" b="1" i="1" dirty="0">
-              <a:uFill>
-                <a:solidFill/>
-              </a:uFill>
-              <a:latin typeface="Arial Unicode MS" panose="020B0604020202020204" pitchFamily="34" charset="-128"/>
-              <a:ea typeface="Arial Unicode MS" panose="020B0604020202020204" pitchFamily="34" charset="-128"/>
-              <a:cs typeface="Arial Unicode MS" panose="020B0604020202020204" pitchFamily="34" charset="-128"/>
-              <a:sym typeface="Iowan Old Style Roman"/>
-            </a:endParaRPr>
-          </a:p>
-        </p:txBody>
-      </p:sp>
-      <p:sp>
-        <p:nvSpPr>
-          <p:cNvPr id="4" name="Shape 27"/>
-          <p:cNvSpPr/>
-          <p:nvPr/>
-        </p:nvSpPr>
-        <p:spPr>
-          <a:xfrm>
-            <a:off x="31850" y="1524234"/>
-            <a:ext cx="9041258" cy="1992853"/>
-          </a:xfrm>
-          <a:prstGeom prst="rect">
-            <a:avLst/>
-          </a:prstGeom>
-          <a:ln w="12700">
-            <a:miter lim="400000"/>
-          </a:ln>
-          <a:extLst>
-            <a:ext uri="{C572A759-6A51-4108-AA02-DFA0A04FC94B}">
-              <ma14:wrappingTextBoxFlag xmlns="" xmlns:ma14="http://schemas.microsoft.com/office/mac/drawingml/2011/main" val="1"/>
-            </a:ext>
-          </a:extLst>
-        </p:spPr>
-        <p:txBody>
-          <a:bodyPr wrap="square" lIns="45719" rIns="45719">
-            <a:spAutoFit/>
-          </a:bodyPr>
-          <a:lstStyle/>
-          <a:p>
-            <a:pPr marL="457200" lvl="0" indent="-457200">
-              <a:spcBef>
-                <a:spcPts val="700"/>
-              </a:spcBef>
-              <a:buFont typeface="Arial" panose="020B0604020202020204" pitchFamily="34" charset="0"/>
-              <a:buChar char="•"/>
-              <a:defRPr sz="1800">
-                <a:solidFill>
-                  <a:srgbClr val="000000"/>
-                </a:solidFill>
-                <a:uFillTx/>
-              </a:defRPr>
-            </a:pPr>
-            <a:r>
-              <a:rPr lang="en-US" sz="2600" dirty="0">
-                <a:uFill>
-                  <a:solidFill/>
-                </a:uFill>
-                <a:latin typeface="Arial Unicode MS" panose="020B0604020202020204" pitchFamily="34" charset="-128"/>
-                <a:ea typeface="Arial Unicode MS" panose="020B0604020202020204" pitchFamily="34" charset="-128"/>
-                <a:cs typeface="Arial Unicode MS" panose="020B0604020202020204" pitchFamily="34" charset="-128"/>
-                <a:sym typeface="Iowan Old Style Roman"/>
-              </a:rPr>
-              <a:t>Write down three queries that you would like to answer</a:t>
-            </a:r>
-          </a:p>
-          <a:p>
-            <a:pPr lvl="0">
-              <a:spcBef>
-                <a:spcPts val="700"/>
-              </a:spcBef>
-              <a:defRPr sz="1800">
-                <a:solidFill>
-                  <a:srgbClr val="000000"/>
-                </a:solidFill>
-                <a:uFillTx/>
-              </a:defRPr>
-            </a:pPr>
-            <a:r>
-              <a:rPr lang="en-US" sz="2600" dirty="0">
-                <a:uFill>
-                  <a:solidFill/>
-                </a:uFill>
-                <a:latin typeface="Arial Unicode MS" panose="020B0604020202020204" pitchFamily="34" charset="-128"/>
-                <a:ea typeface="Arial Unicode MS" panose="020B0604020202020204" pitchFamily="34" charset="-128"/>
-                <a:cs typeface="Arial Unicode MS" panose="020B0604020202020204" pitchFamily="34" charset="-128"/>
-                <a:sym typeface="Iowan Old Style Roman"/>
-              </a:rPr>
-              <a:t>	</a:t>
-            </a:r>
-            <a:r>
-              <a:rPr lang="en-US" sz="2000" dirty="0">
-                <a:uFill>
-                  <a:solidFill/>
-                </a:uFill>
-                <a:latin typeface="Arial Unicode MS" panose="020B0604020202020204" pitchFamily="34" charset="-128"/>
-                <a:ea typeface="Arial Unicode MS" panose="020B0604020202020204" pitchFamily="34" charset="-128"/>
-                <a:cs typeface="Arial Unicode MS" panose="020B0604020202020204" pitchFamily="34" charset="-128"/>
-                <a:sym typeface="Iowan Old Style Roman"/>
-              </a:rPr>
-              <a:t>(Ensure that the information exists in a </a:t>
-            </a:r>
-            <a:r>
-              <a:rPr lang="en-US" sz="2000" b="1" i="1" dirty="0">
-                <a:uFill>
-                  <a:solidFill/>
-                </a:uFill>
-                <a:latin typeface="Arial Unicode MS" panose="020B0604020202020204" pitchFamily="34" charset="-128"/>
-                <a:ea typeface="Arial Unicode MS" panose="020B0604020202020204" pitchFamily="34" charset="-128"/>
-                <a:cs typeface="Arial Unicode MS" panose="020B0604020202020204" pitchFamily="34" charset="-128"/>
-                <a:sym typeface="Iowan Old Style Roman"/>
-              </a:rPr>
-              <a:t>single</a:t>
-            </a:r>
-            <a:r>
-              <a:rPr lang="en-US" sz="2000" dirty="0">
-                <a:uFill>
-                  <a:solidFill/>
-                </a:uFill>
-                <a:latin typeface="Arial Unicode MS" panose="020B0604020202020204" pitchFamily="34" charset="-128"/>
-                <a:ea typeface="Arial Unicode MS" panose="020B0604020202020204" pitchFamily="34" charset="-128"/>
-                <a:cs typeface="Arial Unicode MS" panose="020B0604020202020204" pitchFamily="34" charset="-128"/>
-                <a:sym typeface="Iowan Old Style Roman"/>
-              </a:rPr>
-              <a:t> table, for now)</a:t>
-            </a:r>
-            <a:endParaRPr lang="en-US" dirty="0">
-              <a:uFill>
-                <a:solidFill/>
-              </a:uFill>
-              <a:latin typeface="Arial Unicode MS" panose="020B0604020202020204" pitchFamily="34" charset="-128"/>
-              <a:ea typeface="Arial Unicode MS" panose="020B0604020202020204" pitchFamily="34" charset="-128"/>
-              <a:cs typeface="Arial Unicode MS" panose="020B0604020202020204" pitchFamily="34" charset="-128"/>
-              <a:sym typeface="Iowan Old Style Roman"/>
-            </a:endParaRPr>
-          </a:p>
-          <a:p>
-            <a:pPr lvl="0">
-              <a:spcBef>
-                <a:spcPts val="700"/>
-              </a:spcBef>
-              <a:defRPr sz="1800">
-                <a:solidFill>
-                  <a:srgbClr val="000000"/>
-                </a:solidFill>
-                <a:uFillTx/>
-              </a:defRPr>
-            </a:pPr>
-            <a:endParaRPr lang="en-US" sz="2700" dirty="0">
-              <a:uFill>
-                <a:solidFill/>
-              </a:uFill>
-              <a:latin typeface="Arial Unicode MS" panose="020B0604020202020204" pitchFamily="34" charset="-128"/>
-              <a:ea typeface="Arial Unicode MS" panose="020B0604020202020204" pitchFamily="34" charset="-128"/>
-              <a:cs typeface="Arial Unicode MS" panose="020B0604020202020204" pitchFamily="34" charset="-128"/>
-              <a:sym typeface="Iowan Old Style Roman"/>
-            </a:endParaRPr>
-          </a:p>
-          <a:p>
-            <a:pPr marL="457200" lvl="0" indent="-457200">
-              <a:spcBef>
-                <a:spcPts val="700"/>
-              </a:spcBef>
-              <a:buFont typeface="Arial" panose="020B0604020202020204" pitchFamily="34" charset="0"/>
-              <a:buChar char="•"/>
-              <a:defRPr sz="1800">
-                <a:solidFill>
-                  <a:srgbClr val="000000"/>
-                </a:solidFill>
-                <a:uFillTx/>
-              </a:defRPr>
-            </a:pPr>
-            <a:r>
-              <a:rPr lang="en-US" sz="2700" dirty="0">
-                <a:uFill>
-                  <a:solidFill/>
-                </a:uFill>
-                <a:latin typeface="Arial Unicode MS" panose="020B0604020202020204" pitchFamily="34" charset="-128"/>
-                <a:ea typeface="Arial Unicode MS" panose="020B0604020202020204" pitchFamily="34" charset="-128"/>
-                <a:cs typeface="Arial Unicode MS" panose="020B0604020202020204" pitchFamily="34" charset="-128"/>
-                <a:sym typeface="Iowan Old Style Roman"/>
-              </a:rPr>
-              <a:t>Let’s answer them in class…</a:t>
-            </a:r>
-            <a:endParaRPr sz="2700" dirty="0">
-              <a:uFill>
-                <a:solidFill/>
-              </a:uFill>
-              <a:latin typeface="Arial Unicode MS" panose="020B0604020202020204" pitchFamily="34" charset="-128"/>
-              <a:ea typeface="Arial Unicode MS" panose="020B0604020202020204" pitchFamily="34" charset="-128"/>
-              <a:cs typeface="Arial Unicode MS" panose="020B0604020202020204" pitchFamily="34" charset="-128"/>
-              <a:sym typeface="Iowan Old Style Roman"/>
-            </a:endParaRPr>
-          </a:p>
-        </p:txBody>
-      </p:sp>
-    </p:spTree>
-    <p:extLst>
-      <p:ext uri="{BB962C8B-B14F-4D97-AF65-F5344CB8AC3E}">
-        <p14:creationId xmlns:p14="http://schemas.microsoft.com/office/powerpoint/2010/main" val="969940611"/>
-      </p:ext>
-    </p:extLst>
-  </p:cSld>
-  <p:clrMapOvr>
-    <a:masterClrMapping/>
-  </p:clrMapOvr>
-  <p:transition spd="med"/>
-</p:sld>
-</file>
-
-<file path=ppt/slides/slide21.xml><?xml version="1.0" encoding="utf-8"?>
-<p:sld xmlns:a="http://schemas.openxmlformats.org/drawingml/2006/main" xmlns:r="http://schemas.openxmlformats.org/officeDocument/2006/relationships" xmlns:p="http://schemas.openxmlformats.org/presentationml/2006/main">
-  <p:cSld>
-    <p:spTree>
-      <p:nvGrpSpPr>
-        <p:cNvPr id="1" name=""/>
-        <p:cNvGrpSpPr/>
-        <p:nvPr/>
-      </p:nvGrpSpPr>
-      <p:grpSpPr>
-        <a:xfrm>
-          <a:off x="0" y="0"/>
-          <a:ext cx="0" cy="0"/>
-          <a:chOff x="0" y="0"/>
-          <a:chExt cx="0" cy="0"/>
-        </a:xfrm>
-      </p:grpSpPr>
-      <p:sp>
-        <p:nvSpPr>
-          <p:cNvPr id="2" name="Rectangle 1">
-            <a:extLst>
-              <a:ext uri="{FF2B5EF4-FFF2-40B4-BE49-F238E27FC236}">
-                <a16:creationId xmlns:a16="http://schemas.microsoft.com/office/drawing/2014/main" id="{7148B51A-A7D0-4EB3-97C5-23CDCE187BB7}"/>
-              </a:ext>
-            </a:extLst>
-          </p:cNvPr>
-          <p:cNvSpPr/>
-          <p:nvPr/>
-        </p:nvSpPr>
-        <p:spPr>
-          <a:xfrm>
-            <a:off x="1025235" y="1277173"/>
-            <a:ext cx="7342909" cy="4031873"/>
-          </a:xfrm>
-          <a:prstGeom prst="rect">
-            <a:avLst/>
-          </a:prstGeom>
-        </p:spPr>
-        <p:txBody>
-          <a:bodyPr wrap="square">
-            <a:spAutoFit/>
-          </a:bodyPr>
-          <a:lstStyle/>
-          <a:p>
-            <a:r>
-              <a:rPr lang="en-US" sz="3200" dirty="0"/>
-              <a:t>Go to the Facebook database</a:t>
-            </a:r>
-          </a:p>
-          <a:p>
-            <a:endParaRPr lang="en-US" sz="3200" dirty="0"/>
-          </a:p>
-          <a:p>
-            <a:r>
-              <a:rPr lang="en-US" sz="3200" dirty="0"/>
-              <a:t>Find all the students that have New York as the home state. </a:t>
-            </a:r>
-          </a:p>
-          <a:p>
-            <a:endParaRPr lang="en-US" sz="3200" dirty="0"/>
-          </a:p>
-          <a:p>
-            <a:r>
-              <a:rPr lang="en-US" sz="3200" dirty="0"/>
-              <a:t>Deal with all the different ways that students have written New York in the “</a:t>
-            </a:r>
-            <a:r>
-              <a:rPr lang="en-US" sz="3200" dirty="0" err="1"/>
-              <a:t>HomeState</a:t>
-            </a:r>
-            <a:r>
-              <a:rPr lang="en-US" sz="3200" dirty="0"/>
-              <a:t>” attribute</a:t>
-            </a:r>
-          </a:p>
-        </p:txBody>
-      </p:sp>
-    </p:spTree>
-    <p:extLst>
-      <p:ext uri="{BB962C8B-B14F-4D97-AF65-F5344CB8AC3E}">
-        <p14:creationId xmlns:p14="http://schemas.microsoft.com/office/powerpoint/2010/main" val="1059645985"/>
-      </p:ext>
-    </p:extLst>
-  </p:cSld>
-  <p:clrMapOvr>
-    <a:masterClrMapping/>
-  </p:clrMapOvr>
-  <p:transition spd="med"/>
-</p:sld>
-</file>
-
 <file path=ppt/slides/slide3.xml><?xml version="1.0" encoding="utf-8"?>
 <p:sld xmlns:a="http://schemas.openxmlformats.org/drawingml/2006/main" xmlns:r="http://schemas.openxmlformats.org/officeDocument/2006/relationships" xmlns:p="http://schemas.openxmlformats.org/presentationml/2006/main">
   <p:cSld>
@@ -9047,7 +8123,7 @@
           </a:ln>
           <a:extLst>
             <a:ext uri="{C572A759-6A51-4108-AA02-DFA0A04FC94B}">
-              <ma14:wrappingTextBoxFlag xmlns="" xmlns:ma14="http://schemas.microsoft.com/office/mac/drawingml/2011/main" val="1"/>
+              <ma14:wrappingTextBoxFlag xmlns:ma14="http://schemas.microsoft.com/office/mac/drawingml/2011/main" xmlns="" val="1"/>
             </a:ext>
           </a:extLst>
         </p:spPr>
@@ -9358,7 +8434,7 @@
           </a:ln>
           <a:extLst>
             <a:ext uri="{C572A759-6A51-4108-AA02-DFA0A04FC94B}">
-              <ma14:wrappingTextBoxFlag xmlns="" xmlns:ma14="http://schemas.microsoft.com/office/mac/drawingml/2011/main" val="1"/>
+              <ma14:wrappingTextBoxFlag xmlns:ma14="http://schemas.microsoft.com/office/mac/drawingml/2011/main" xmlns="" val="1"/>
             </a:ext>
           </a:extLst>
         </p:spPr>
@@ -9460,7 +8536,7 @@
           </a:ln>
           <a:extLst>
             <a:ext uri="{C572A759-6A51-4108-AA02-DFA0A04FC94B}">
-              <ma14:wrappingTextBoxFlag xmlns="" xmlns:ma14="http://schemas.microsoft.com/office/mac/drawingml/2011/main" val="1"/>
+              <ma14:wrappingTextBoxFlag xmlns:ma14="http://schemas.microsoft.com/office/mac/drawingml/2011/main" xmlns="" val="1"/>
             </a:ext>
           </a:extLst>
         </p:spPr>
@@ -9752,7 +8828,7 @@
           </a:ln>
           <a:extLst>
             <a:ext uri="{C572A759-6A51-4108-AA02-DFA0A04FC94B}">
-              <ma14:wrappingTextBoxFlag xmlns="" xmlns:ma14="http://schemas.microsoft.com/office/mac/drawingml/2011/main" val="1"/>
+              <ma14:wrappingTextBoxFlag xmlns:ma14="http://schemas.microsoft.com/office/mac/drawingml/2011/main" xmlns="" val="1"/>
             </a:ext>
           </a:extLst>
         </p:spPr>
@@ -10242,7 +9318,7 @@
           </a:ln>
           <a:extLst>
             <a:ext uri="{C572A759-6A51-4108-AA02-DFA0A04FC94B}">
-              <ma14:wrappingTextBoxFlag xmlns="" xmlns:ma14="http://schemas.microsoft.com/office/mac/drawingml/2011/main" val="1"/>
+              <ma14:wrappingTextBoxFlag xmlns:ma14="http://schemas.microsoft.com/office/mac/drawingml/2011/main" xmlns="" val="1"/>
             </a:ext>
           </a:extLst>
         </p:spPr>
@@ -10344,7 +9420,7 @@
           </a:ln>
           <a:extLst>
             <a:ext uri="{C572A759-6A51-4108-AA02-DFA0A04FC94B}">
-              <ma14:wrappingTextBoxFlag xmlns="" xmlns:ma14="http://schemas.microsoft.com/office/mac/drawingml/2011/main" val="1"/>
+              <ma14:wrappingTextBoxFlag xmlns:ma14="http://schemas.microsoft.com/office/mac/drawingml/2011/main" xmlns="" val="1"/>
             </a:ext>
           </a:extLst>
         </p:spPr>
@@ -10793,7 +9869,7 @@
           </a:ln>
           <a:extLst>
             <a:ext uri="{C572A759-6A51-4108-AA02-DFA0A04FC94B}">
-              <ma14:wrappingTextBoxFlag xmlns="" xmlns:ma14="http://schemas.microsoft.com/office/mac/drawingml/2011/main" val="1"/>
+              <ma14:wrappingTextBoxFlag xmlns:ma14="http://schemas.microsoft.com/office/mac/drawingml/2011/main" xmlns="" val="1"/>
             </a:ext>
           </a:extLst>
         </p:spPr>
@@ -11747,7 +10823,7 @@
           </a:ln>
           <a:extLst>
             <a:ext uri="{C572A759-6A51-4108-AA02-DFA0A04FC94B}">
-              <ma14:wrappingTextBoxFlag xmlns="" xmlns:ma14="http://schemas.microsoft.com/office/mac/drawingml/2011/main" val="1"/>
+              <ma14:wrappingTextBoxFlag xmlns:ma14="http://schemas.microsoft.com/office/mac/drawingml/2011/main" xmlns="" val="1"/>
             </a:ext>
           </a:extLst>
         </p:spPr>
@@ -11849,7 +10925,7 @@
           </a:ln>
           <a:extLst>
             <a:ext uri="{C572A759-6A51-4108-AA02-DFA0A04FC94B}">
-              <ma14:wrappingTextBoxFlag xmlns="" xmlns:ma14="http://schemas.microsoft.com/office/mac/drawingml/2011/main" val="1"/>
+              <ma14:wrappingTextBoxFlag xmlns:ma14="http://schemas.microsoft.com/office/mac/drawingml/2011/main" xmlns="" val="1"/>
             </a:ext>
           </a:extLst>
         </p:spPr>
@@ -12154,7 +11230,7 @@
           </a:ln>
           <a:extLst>
             <a:ext uri="{C572A759-6A51-4108-AA02-DFA0A04FC94B}">
-              <ma14:wrappingTextBoxFlag xmlns="" xmlns:ma14="http://schemas.microsoft.com/office/mac/drawingml/2011/main" val="1"/>
+              <ma14:wrappingTextBoxFlag xmlns:ma14="http://schemas.microsoft.com/office/mac/drawingml/2011/main" xmlns="" val="1"/>
             </a:ext>
           </a:extLst>
         </p:spPr>

</xml_diff>